<commit_message>
Fixing Spring server tests
</commit_message>
<xml_diff>
--- a/Presentation/Development/Development.pptx
+++ b/Presentation/Development/Development.pptx
@@ -7,8 +7,8 @@
   <p:sldIdLst>
     <p:sldId id="257" r:id="rId2"/>
     <p:sldId id="258" r:id="rId3"/>
-    <p:sldId id="259" r:id="rId4"/>
-    <p:sldId id="260" r:id="rId5"/>
+    <p:sldId id="260" r:id="rId4"/>
+    <p:sldId id="261" r:id="rId5"/>
   </p:sldIdLst>
   <p:sldSz cx="12192000" cy="6858000"/>
   <p:notesSz cx="6858000" cy="9144000"/>
@@ -107,6 +107,11 @@
       </a:defRPr>
     </a:lvl9pPr>
   </p:defaultTextStyle>
+  <p:extLst>
+    <p:ext uri="{EFAFB233-063F-42B5-8137-9DF3F51BA10A}">
+      <p15:sldGuideLst xmlns:p15="http://schemas.microsoft.com/office/powerpoint/2012/main"/>
+    </p:ext>
+  </p:extLst>
 </p:presentation>
 </file>
 
@@ -259,7 +264,7 @@
           <a:p>
             <a:fld id="{D4834CF3-79D4-44A3-8C8D-D1A04B87C631}" type="datetimeFigureOut">
               <a:rPr lang="en-GB" smtClean="0"/>
-              <a:t>16/04/2023</a:t>
+              <a:t>20/04/2023</a:t>
             </a:fld>
             <a:endParaRPr lang="en-GB"/>
           </a:p>
@@ -459,7 +464,7 @@
           <a:p>
             <a:fld id="{D4834CF3-79D4-44A3-8C8D-D1A04B87C631}" type="datetimeFigureOut">
               <a:rPr lang="en-GB" smtClean="0"/>
-              <a:t>16/04/2023</a:t>
+              <a:t>20/04/2023</a:t>
             </a:fld>
             <a:endParaRPr lang="en-GB"/>
           </a:p>
@@ -669,7 +674,7 @@
           <a:p>
             <a:fld id="{D4834CF3-79D4-44A3-8C8D-D1A04B87C631}" type="datetimeFigureOut">
               <a:rPr lang="en-GB" smtClean="0"/>
-              <a:t>16/04/2023</a:t>
+              <a:t>20/04/2023</a:t>
             </a:fld>
             <a:endParaRPr lang="en-GB"/>
           </a:p>
@@ -869,7 +874,7 @@
           <a:p>
             <a:fld id="{D4834CF3-79D4-44A3-8C8D-D1A04B87C631}" type="datetimeFigureOut">
               <a:rPr lang="en-GB" smtClean="0"/>
-              <a:t>16/04/2023</a:t>
+              <a:t>20/04/2023</a:t>
             </a:fld>
             <a:endParaRPr lang="en-GB"/>
           </a:p>
@@ -1145,7 +1150,7 @@
           <a:p>
             <a:fld id="{D4834CF3-79D4-44A3-8C8D-D1A04B87C631}" type="datetimeFigureOut">
               <a:rPr lang="en-GB" smtClean="0"/>
-              <a:t>16/04/2023</a:t>
+              <a:t>20/04/2023</a:t>
             </a:fld>
             <a:endParaRPr lang="en-GB"/>
           </a:p>
@@ -1413,7 +1418,7 @@
           <a:p>
             <a:fld id="{D4834CF3-79D4-44A3-8C8D-D1A04B87C631}" type="datetimeFigureOut">
               <a:rPr lang="en-GB" smtClean="0"/>
-              <a:t>16/04/2023</a:t>
+              <a:t>20/04/2023</a:t>
             </a:fld>
             <a:endParaRPr lang="en-GB"/>
           </a:p>
@@ -1828,7 +1833,7 @@
           <a:p>
             <a:fld id="{D4834CF3-79D4-44A3-8C8D-D1A04B87C631}" type="datetimeFigureOut">
               <a:rPr lang="en-GB" smtClean="0"/>
-              <a:t>16/04/2023</a:t>
+              <a:t>20/04/2023</a:t>
             </a:fld>
             <a:endParaRPr lang="en-GB"/>
           </a:p>
@@ -1970,7 +1975,7 @@
           <a:p>
             <a:fld id="{D4834CF3-79D4-44A3-8C8D-D1A04B87C631}" type="datetimeFigureOut">
               <a:rPr lang="en-GB" smtClean="0"/>
-              <a:t>16/04/2023</a:t>
+              <a:t>20/04/2023</a:t>
             </a:fld>
             <a:endParaRPr lang="en-GB"/>
           </a:p>
@@ -2083,7 +2088,7 @@
           <a:p>
             <a:fld id="{D4834CF3-79D4-44A3-8C8D-D1A04B87C631}" type="datetimeFigureOut">
               <a:rPr lang="en-GB" smtClean="0"/>
-              <a:t>16/04/2023</a:t>
+              <a:t>20/04/2023</a:t>
             </a:fld>
             <a:endParaRPr lang="en-GB"/>
           </a:p>
@@ -2396,7 +2401,7 @@
           <a:p>
             <a:fld id="{D4834CF3-79D4-44A3-8C8D-D1A04B87C631}" type="datetimeFigureOut">
               <a:rPr lang="en-GB" smtClean="0"/>
-              <a:t>16/04/2023</a:t>
+              <a:t>20/04/2023</a:t>
             </a:fld>
             <a:endParaRPr lang="en-GB"/>
           </a:p>
@@ -2685,7 +2690,7 @@
           <a:p>
             <a:fld id="{D4834CF3-79D4-44A3-8C8D-D1A04B87C631}" type="datetimeFigureOut">
               <a:rPr lang="en-GB" smtClean="0"/>
-              <a:t>16/04/2023</a:t>
+              <a:t>20/04/2023</a:t>
             </a:fld>
             <a:endParaRPr lang="en-GB"/>
           </a:p>
@@ -2928,7 +2933,7 @@
           <a:p>
             <a:fld id="{D4834CF3-79D4-44A3-8C8D-D1A04B87C631}" type="datetimeFigureOut">
               <a:rPr lang="en-GB" smtClean="0"/>
-              <a:t>16/04/2023</a:t>
+              <a:t>20/04/2023</a:t>
             </a:fld>
             <a:endParaRPr lang="en-GB"/>
           </a:p>
@@ -4929,14 +4934,6 @@
 <file path=ppt/slides/slide3.xml><?xml version="1.0" encoding="utf-8"?>
 <p:sld xmlns:a="http://schemas.openxmlformats.org/drawingml/2006/main" xmlns:r="http://schemas.openxmlformats.org/officeDocument/2006/relationships" xmlns:p="http://schemas.openxmlformats.org/presentationml/2006/main">
   <p:cSld>
-    <p:bg>
-      <p:bgPr>
-        <a:solidFill>
-          <a:schemeClr val="bg1"/>
-        </a:solidFill>
-        <a:effectLst/>
-      </p:bgPr>
-    </p:bg>
     <p:spTree>
       <p:nvGrpSpPr>
         <p:cNvPr id="1" name=""/>
@@ -4951,72 +4948,12 @@
           <a:chExt cx="0" cy="0"/>
         </a:xfrm>
       </p:grpSpPr>
-      <p:sp useBgFill="1">
-        <p:nvSpPr>
-          <p:cNvPr id="13" name="Rectangle 12">
-            <a:extLst>
-              <a:ext uri="{FF2B5EF4-FFF2-40B4-BE49-F238E27FC236}">
-                <a16:creationId xmlns:a16="http://schemas.microsoft.com/office/drawing/2014/main" id="{BCED4D40-4B67-4331-AC48-79B82B4A47D8}"/>
-              </a:ext>
-              <a:ext uri="{C183D7F6-B498-43B3-948B-1728B52AA6E4}">
-                <adec:decorative xmlns:adec="http://schemas.microsoft.com/office/drawing/2017/decorative" val="1"/>
-              </a:ext>
-            </a:extLst>
-          </p:cNvPr>
-          <p:cNvSpPr>
-            <a:spLocks noGrp="1" noRot="1" noChangeAspect="1" noMove="1" noResize="1" noEditPoints="1" noAdjustHandles="1" noChangeArrowheads="1" noChangeShapeType="1" noTextEdit="1"/>
-          </p:cNvSpPr>
-          <p:nvPr>
-            <p:extLst>
-              <p:ext uri="{386F3935-93C4-4BCD-93E2-E3B085C9AB24}">
-                <p16:designElem xmlns:p16="http://schemas.microsoft.com/office/powerpoint/2015/main" val="1"/>
-              </p:ext>
-            </p:extLst>
-          </p:nvPr>
-        </p:nvSpPr>
-        <p:spPr>
-          <a:xfrm>
-            <a:off x="0" y="0"/>
-            <a:ext cx="12192000" cy="6858000"/>
-          </a:xfrm>
-          <a:prstGeom prst="rect">
-            <a:avLst/>
-          </a:prstGeom>
-          <a:ln>
-            <a:noFill/>
-          </a:ln>
-        </p:spPr>
-        <p:style>
-          <a:lnRef idx="2">
-            <a:schemeClr val="accent1">
-              <a:shade val="50000"/>
-            </a:schemeClr>
-          </a:lnRef>
-          <a:fillRef idx="1">
-            <a:schemeClr val="accent1"/>
-          </a:fillRef>
-          <a:effectRef idx="0">
-            <a:schemeClr val="accent1"/>
-          </a:effectRef>
-          <a:fontRef idx="minor">
-            <a:schemeClr val="lt1"/>
-          </a:fontRef>
-        </p:style>
-        <p:txBody>
-          <a:bodyPr rtlCol="0" anchor="ctr"/>
-          <a:lstStyle/>
-          <a:p>
-            <a:pPr algn="ctr"/>
-            <a:endParaRPr lang="en-US"/>
-          </a:p>
-        </p:txBody>
-      </p:sp>
       <p:sp>
         <p:nvSpPr>
           <p:cNvPr id="2" name="Título 1">
             <a:extLst>
               <a:ext uri="{FF2B5EF4-FFF2-40B4-BE49-F238E27FC236}">
-                <a16:creationId xmlns:a16="http://schemas.microsoft.com/office/drawing/2014/main" id="{FC4145A7-258C-67FC-A81D-5067173ECB6F}"/>
+                <a16:creationId xmlns:a16="http://schemas.microsoft.com/office/drawing/2014/main" id="{100FF2B4-CB83-0390-1FAE-9D27E3CF6368}"/>
               </a:ext>
             </a:extLst>
           </p:cNvPr>
@@ -5027,391 +4964,24 @@
             <p:ph type="title"/>
           </p:nvPr>
         </p:nvSpPr>
-        <p:spPr>
-          <a:xfrm>
-            <a:off x="638881" y="417576"/>
-            <a:ext cx="10909640" cy="1249394"/>
-          </a:xfrm>
-        </p:spPr>
-        <p:txBody>
-          <a:bodyPr vert="horz" lIns="91440" tIns="45720" rIns="91440" bIns="45720" rtlCol="0" anchor="ctr">
-            <a:normAutofit/>
-          </a:bodyPr>
-          <a:lstStyle/>
-          <a:p>
-            <a:pPr algn="ctr"/>
-            <a:r>
-              <a:rPr lang="en-US" sz="6600" b="0" i="0" kern="1200">
-                <a:solidFill>
-                  <a:schemeClr val="tx1"/>
-                </a:solidFill>
-                <a:effectLst/>
-                <a:latin typeface="+mj-lt"/>
-                <a:ea typeface="+mj-ea"/>
-                <a:cs typeface="+mj-cs"/>
-              </a:rPr>
-              <a:t>Requisitos funcionais</a:t>
-            </a:r>
-            <a:endParaRPr lang="en-US" sz="6600" kern="1200">
-              <a:solidFill>
-                <a:schemeClr val="tx1"/>
-              </a:solidFill>
-              <a:latin typeface="+mj-lt"/>
-              <a:ea typeface="+mj-ea"/>
-              <a:cs typeface="+mj-cs"/>
-            </a:endParaRPr>
-          </a:p>
-        </p:txBody>
-      </p:sp>
-      <p:sp>
-        <p:nvSpPr>
-          <p:cNvPr id="15" name="sketch line">
-            <a:extLst>
-              <a:ext uri="{FF2B5EF4-FFF2-40B4-BE49-F238E27FC236}">
-                <a16:creationId xmlns:a16="http://schemas.microsoft.com/office/drawing/2014/main" id="{670CEDEF-4F34-412E-84EE-329C1E936AF5}"/>
-              </a:ext>
-              <a:ext uri="{C183D7F6-B498-43B3-948B-1728B52AA6E4}">
-                <adec:decorative xmlns:adec="http://schemas.microsoft.com/office/drawing/2017/decorative" val="1"/>
-              </a:ext>
-            </a:extLst>
-          </p:cNvPr>
-          <p:cNvSpPr>
-            <a:spLocks noGrp="1" noRot="1" noChangeAspect="1" noMove="1" noResize="1" noEditPoints="1" noAdjustHandles="1" noChangeArrowheads="1" noChangeShapeType="1" noTextEdit="1"/>
-          </p:cNvSpPr>
-          <p:nvPr>
-            <p:extLst>
-              <p:ext uri="{386F3935-93C4-4BCD-93E2-E3B085C9AB24}">
-                <p16:designElem xmlns:p16="http://schemas.microsoft.com/office/powerpoint/2015/main" val="1"/>
-              </p:ext>
-            </p:extLst>
-          </p:nvPr>
-        </p:nvSpPr>
-        <p:spPr>
-          <a:xfrm>
-            <a:off x="3807702" y="1733454"/>
-            <a:ext cx="4572000" cy="18288"/>
-          </a:xfrm>
-          <a:custGeom>
-            <a:avLst/>
-            <a:gdLst>
-              <a:gd name="connsiteX0" fmla="*/ 0 w 4572000"/>
-              <a:gd name="connsiteY0" fmla="*/ 0 h 18288"/>
-              <a:gd name="connsiteX1" fmla="*/ 515983 w 4572000"/>
-              <a:gd name="connsiteY1" fmla="*/ 0 h 18288"/>
-              <a:gd name="connsiteX2" fmla="*/ 1031966 w 4572000"/>
-              <a:gd name="connsiteY2" fmla="*/ 0 h 18288"/>
-              <a:gd name="connsiteX3" fmla="*/ 1639389 w 4572000"/>
-              <a:gd name="connsiteY3" fmla="*/ 0 h 18288"/>
-              <a:gd name="connsiteX4" fmla="*/ 2383971 w 4572000"/>
-              <a:gd name="connsiteY4" fmla="*/ 0 h 18288"/>
-              <a:gd name="connsiteX5" fmla="*/ 2945674 w 4572000"/>
-              <a:gd name="connsiteY5" fmla="*/ 0 h 18288"/>
-              <a:gd name="connsiteX6" fmla="*/ 3507377 w 4572000"/>
-              <a:gd name="connsiteY6" fmla="*/ 0 h 18288"/>
-              <a:gd name="connsiteX7" fmla="*/ 4572000 w 4572000"/>
-              <a:gd name="connsiteY7" fmla="*/ 0 h 18288"/>
-              <a:gd name="connsiteX8" fmla="*/ 4572000 w 4572000"/>
-              <a:gd name="connsiteY8" fmla="*/ 18288 h 18288"/>
-              <a:gd name="connsiteX9" fmla="*/ 3873137 w 4572000"/>
-              <a:gd name="connsiteY9" fmla="*/ 18288 h 18288"/>
-              <a:gd name="connsiteX10" fmla="*/ 3311434 w 4572000"/>
-              <a:gd name="connsiteY10" fmla="*/ 18288 h 18288"/>
-              <a:gd name="connsiteX11" fmla="*/ 2749731 w 4572000"/>
-              <a:gd name="connsiteY11" fmla="*/ 18288 h 18288"/>
-              <a:gd name="connsiteX12" fmla="*/ 2050869 w 4572000"/>
-              <a:gd name="connsiteY12" fmla="*/ 18288 h 18288"/>
-              <a:gd name="connsiteX13" fmla="*/ 1306286 w 4572000"/>
-              <a:gd name="connsiteY13" fmla="*/ 18288 h 18288"/>
-              <a:gd name="connsiteX14" fmla="*/ 790303 w 4572000"/>
-              <a:gd name="connsiteY14" fmla="*/ 18288 h 18288"/>
-              <a:gd name="connsiteX15" fmla="*/ 0 w 4572000"/>
-              <a:gd name="connsiteY15" fmla="*/ 18288 h 18288"/>
-              <a:gd name="connsiteX16" fmla="*/ 0 w 4572000"/>
-              <a:gd name="connsiteY16" fmla="*/ 0 h 18288"/>
-            </a:gdLst>
-            <a:ahLst/>
-            <a:cxnLst>
-              <a:cxn ang="0">
-                <a:pos x="connsiteX0" y="connsiteY0"/>
-              </a:cxn>
-              <a:cxn ang="0">
-                <a:pos x="connsiteX1" y="connsiteY1"/>
-              </a:cxn>
-              <a:cxn ang="0">
-                <a:pos x="connsiteX2" y="connsiteY2"/>
-              </a:cxn>
-              <a:cxn ang="0">
-                <a:pos x="connsiteX3" y="connsiteY3"/>
-              </a:cxn>
-              <a:cxn ang="0">
-                <a:pos x="connsiteX4" y="connsiteY4"/>
-              </a:cxn>
-              <a:cxn ang="0">
-                <a:pos x="connsiteX5" y="connsiteY5"/>
-              </a:cxn>
-              <a:cxn ang="0">
-                <a:pos x="connsiteX6" y="connsiteY6"/>
-              </a:cxn>
-              <a:cxn ang="0">
-                <a:pos x="connsiteX7" y="connsiteY7"/>
-              </a:cxn>
-              <a:cxn ang="0">
-                <a:pos x="connsiteX8" y="connsiteY8"/>
-              </a:cxn>
-              <a:cxn ang="0">
-                <a:pos x="connsiteX9" y="connsiteY9"/>
-              </a:cxn>
-              <a:cxn ang="0">
-                <a:pos x="connsiteX10" y="connsiteY10"/>
-              </a:cxn>
-              <a:cxn ang="0">
-                <a:pos x="connsiteX11" y="connsiteY11"/>
-              </a:cxn>
-              <a:cxn ang="0">
-                <a:pos x="connsiteX12" y="connsiteY12"/>
-              </a:cxn>
-              <a:cxn ang="0">
-                <a:pos x="connsiteX13" y="connsiteY13"/>
-              </a:cxn>
-              <a:cxn ang="0">
-                <a:pos x="connsiteX14" y="connsiteY14"/>
-              </a:cxn>
-              <a:cxn ang="0">
-                <a:pos x="connsiteX15" y="connsiteY15"/>
-              </a:cxn>
-              <a:cxn ang="0">
-                <a:pos x="connsiteX16" y="connsiteY16"/>
-              </a:cxn>
-            </a:cxnLst>
-            <a:rect l="l" t="t" r="r" b="b"/>
-            <a:pathLst>
-              <a:path w="4572000" h="18288" fill="none" extrusionOk="0">
-                <a:moveTo>
-                  <a:pt x="0" y="0"/>
-                </a:moveTo>
-                <a:cubicBezTo>
-                  <a:pt x="105156" y="-20963"/>
-                  <a:pt x="340432" y="822"/>
-                  <a:pt x="515983" y="0"/>
-                </a:cubicBezTo>
-                <a:cubicBezTo>
-                  <a:pt x="691534" y="-822"/>
-                  <a:pt x="850679" y="16479"/>
-                  <a:pt x="1031966" y="0"/>
-                </a:cubicBezTo>
-                <a:cubicBezTo>
-                  <a:pt x="1213253" y="-16479"/>
-                  <a:pt x="1443646" y="-18730"/>
-                  <a:pt x="1639389" y="0"/>
-                </a:cubicBezTo>
-                <a:cubicBezTo>
-                  <a:pt x="1835132" y="18730"/>
-                  <a:pt x="2159975" y="18531"/>
-                  <a:pt x="2383971" y="0"/>
-                </a:cubicBezTo>
-                <a:cubicBezTo>
-                  <a:pt x="2607967" y="-18531"/>
-                  <a:pt x="2719096" y="-12030"/>
-                  <a:pt x="2945674" y="0"/>
-                </a:cubicBezTo>
-                <a:cubicBezTo>
-                  <a:pt x="3172252" y="12030"/>
-                  <a:pt x="3269167" y="27666"/>
-                  <a:pt x="3507377" y="0"/>
-                </a:cubicBezTo>
-                <a:cubicBezTo>
-                  <a:pt x="3745587" y="-27666"/>
-                  <a:pt x="4116741" y="18705"/>
-                  <a:pt x="4572000" y="0"/>
-                </a:cubicBezTo>
-                <a:cubicBezTo>
-                  <a:pt x="4572895" y="8974"/>
-                  <a:pt x="4571454" y="9359"/>
-                  <a:pt x="4572000" y="18288"/>
-                </a:cubicBezTo>
-                <a:cubicBezTo>
-                  <a:pt x="4374698" y="3942"/>
-                  <a:pt x="4098874" y="-11042"/>
-                  <a:pt x="3873137" y="18288"/>
-                </a:cubicBezTo>
-                <a:cubicBezTo>
-                  <a:pt x="3647400" y="47618"/>
-                  <a:pt x="3517055" y="5421"/>
-                  <a:pt x="3311434" y="18288"/>
-                </a:cubicBezTo>
-                <a:cubicBezTo>
-                  <a:pt x="3105813" y="31155"/>
-                  <a:pt x="3025168" y="17856"/>
-                  <a:pt x="2749731" y="18288"/>
-                </a:cubicBezTo>
-                <a:cubicBezTo>
-                  <a:pt x="2474294" y="18720"/>
-                  <a:pt x="2291766" y="-14168"/>
-                  <a:pt x="2050869" y="18288"/>
-                </a:cubicBezTo>
-                <a:cubicBezTo>
-                  <a:pt x="1809972" y="50744"/>
-                  <a:pt x="1540276" y="46798"/>
-                  <a:pt x="1306286" y="18288"/>
-                </a:cubicBezTo>
-                <a:cubicBezTo>
-                  <a:pt x="1072296" y="-10222"/>
-                  <a:pt x="972445" y="19645"/>
-                  <a:pt x="790303" y="18288"/>
-                </a:cubicBezTo>
-                <a:cubicBezTo>
-                  <a:pt x="608161" y="16931"/>
-                  <a:pt x="200981" y="8241"/>
-                  <a:pt x="0" y="18288"/>
-                </a:cubicBezTo>
-                <a:cubicBezTo>
-                  <a:pt x="-229" y="14222"/>
-                  <a:pt x="509" y="5816"/>
-                  <a:pt x="0" y="0"/>
-                </a:cubicBezTo>
-                <a:close/>
-              </a:path>
-              <a:path w="4572000" h="18288" stroke="0" extrusionOk="0">
-                <a:moveTo>
-                  <a:pt x="0" y="0"/>
-                </a:moveTo>
-                <a:cubicBezTo>
-                  <a:pt x="143285" y="-9565"/>
-                  <a:pt x="327959" y="-11498"/>
-                  <a:pt x="561703" y="0"/>
-                </a:cubicBezTo>
-                <a:cubicBezTo>
-                  <a:pt x="795447" y="11498"/>
-                  <a:pt x="838260" y="18255"/>
-                  <a:pt x="1077686" y="0"/>
-                </a:cubicBezTo>
-                <a:cubicBezTo>
-                  <a:pt x="1317112" y="-18255"/>
-                  <a:pt x="1437472" y="23514"/>
-                  <a:pt x="1639389" y="0"/>
-                </a:cubicBezTo>
-                <a:cubicBezTo>
-                  <a:pt x="1841306" y="-23514"/>
-                  <a:pt x="2037142" y="-12551"/>
-                  <a:pt x="2292531" y="0"/>
-                </a:cubicBezTo>
-                <a:cubicBezTo>
-                  <a:pt x="2547920" y="12551"/>
-                  <a:pt x="2810436" y="-20352"/>
-                  <a:pt x="2991394" y="0"/>
-                </a:cubicBezTo>
-                <a:cubicBezTo>
-                  <a:pt x="3172352" y="20352"/>
-                  <a:pt x="3530025" y="-13347"/>
-                  <a:pt x="3735977" y="0"/>
-                </a:cubicBezTo>
-                <a:cubicBezTo>
-                  <a:pt x="3941929" y="13347"/>
-                  <a:pt x="4161497" y="34086"/>
-                  <a:pt x="4572000" y="0"/>
-                </a:cubicBezTo>
-                <a:cubicBezTo>
-                  <a:pt x="4571545" y="6162"/>
-                  <a:pt x="4571903" y="11775"/>
-                  <a:pt x="4572000" y="18288"/>
-                </a:cubicBezTo>
-                <a:cubicBezTo>
-                  <a:pt x="4228040" y="36490"/>
-                  <a:pt x="4199736" y="42557"/>
-                  <a:pt x="3873137" y="18288"/>
-                </a:cubicBezTo>
-                <a:cubicBezTo>
-                  <a:pt x="3546538" y="-5981"/>
-                  <a:pt x="3472124" y="16809"/>
-                  <a:pt x="3128554" y="18288"/>
-                </a:cubicBezTo>
-                <a:cubicBezTo>
-                  <a:pt x="2784984" y="19767"/>
-                  <a:pt x="2735896" y="-17781"/>
-                  <a:pt x="2383971" y="18288"/>
-                </a:cubicBezTo>
-                <a:cubicBezTo>
-                  <a:pt x="2032046" y="54357"/>
-                  <a:pt x="2019324" y="2920"/>
-                  <a:pt x="1867989" y="18288"/>
-                </a:cubicBezTo>
-                <a:cubicBezTo>
-                  <a:pt x="1716654" y="33656"/>
-                  <a:pt x="1418675" y="32575"/>
-                  <a:pt x="1169126" y="18288"/>
-                </a:cubicBezTo>
-                <a:cubicBezTo>
-                  <a:pt x="919577" y="4001"/>
-                  <a:pt x="798537" y="16165"/>
-                  <a:pt x="561703" y="18288"/>
-                </a:cubicBezTo>
-                <a:cubicBezTo>
-                  <a:pt x="324869" y="20411"/>
-                  <a:pt x="221395" y="-912"/>
-                  <a:pt x="0" y="18288"/>
-                </a:cubicBezTo>
-                <a:cubicBezTo>
-                  <a:pt x="766" y="10800"/>
-                  <a:pt x="-457" y="8180"/>
-                  <a:pt x="0" y="0"/>
-                </a:cubicBezTo>
-                <a:close/>
-              </a:path>
-            </a:pathLst>
-          </a:custGeom>
-          <a:solidFill>
-            <a:schemeClr val="accent2"/>
-          </a:solidFill>
-          <a:ln w="41275" cap="rnd">
-            <a:solidFill>
-              <a:schemeClr val="accent2"/>
-            </a:solidFill>
-            <a:round/>
-            <a:extLst>
-              <a:ext uri="{C807C97D-BFC1-408E-A445-0C87EB9F89A2}">
-                <ask:lineSketchStyleProps xmlns:ask="http://schemas.microsoft.com/office/drawing/2018/sketchyshapes" sd="2727557108">
-                  <a:prstGeom prst="rect">
-                    <a:avLst/>
-                  </a:prstGeom>
-                  <ask:type>
-                    <ask:lineSketchFreehand/>
-                  </ask:type>
-                </ask:lineSketchStyleProps>
-              </a:ext>
-            </a:extLst>
-          </a:ln>
-        </p:spPr>
-        <p:style>
-          <a:lnRef idx="2">
-            <a:schemeClr val="accent1">
-              <a:shade val="50000"/>
-            </a:schemeClr>
-          </a:lnRef>
-          <a:fillRef idx="1">
-            <a:schemeClr val="accent1"/>
-          </a:fillRef>
-          <a:effectRef idx="0">
-            <a:schemeClr val="accent1"/>
-          </a:effectRef>
-          <a:fontRef idx="minor">
-            <a:schemeClr val="lt1"/>
-          </a:fontRef>
-        </p:style>
-        <p:txBody>
-          <a:bodyPr rtlCol="0" anchor="ctr"/>
-          <a:lstStyle/>
-          <a:p>
-            <a:pPr algn="ctr"/>
-            <a:endParaRPr lang="en-US"/>
+        <p:spPr/>
+        <p:txBody>
+          <a:bodyPr/>
+          <a:lstStyle/>
+          <a:p>
+            <a:r>
+              <a:rPr lang="en-GB" dirty="0"/>
+              <a:t>System Architecture</a:t>
+            </a:r>
           </a:p>
         </p:txBody>
       </p:sp>
       <p:pic>
         <p:nvPicPr>
-          <p:cNvPr id="8" name="Marcador de Posição de Conteúdo 6" descr="Uma imagem com diagrama&#10;&#10;Descrição gerada automaticamente">
-            <a:extLst>
-              <a:ext uri="{FF2B5EF4-FFF2-40B4-BE49-F238E27FC236}">
-                <a16:creationId xmlns:a16="http://schemas.microsoft.com/office/drawing/2014/main" id="{D4F5C128-74D5-17FA-8861-905A3C2DC511}"/>
+          <p:cNvPr id="5" name="Marcador de Posição de Conteúdo 4" descr="Uma imagem com diagrama, Esquema, Desenho técnico, file&#10;&#10;Descrição gerada automaticamente">
+            <a:extLst>
+              <a:ext uri="{FF2B5EF4-FFF2-40B4-BE49-F238E27FC236}">
+                <a16:creationId xmlns:a16="http://schemas.microsoft.com/office/drawing/2014/main" id="{081F4255-4308-F471-66A3-A9629132F372}"/>
               </a:ext>
             </a:extLst>
           </p:cNvPr>
@@ -5436,18 +5006,15 @@
         </p:blipFill>
         <p:spPr>
           <a:xfrm>
-            <a:off x="781358" y="2633472"/>
-            <a:ext cx="10626235" cy="3586353"/>
+            <a:off x="838200" y="1928192"/>
+            <a:ext cx="10515600" cy="4146204"/>
           </a:xfrm>
-          <a:prstGeom prst="rect">
-            <a:avLst/>
-          </a:prstGeom>
         </p:spPr>
       </p:pic>
     </p:spTree>
     <p:extLst>
       <p:ext uri="{BB962C8B-B14F-4D97-AF65-F5344CB8AC3E}">
-        <p14:creationId xmlns:p14="http://schemas.microsoft.com/office/powerpoint/2010/main" val="2668477153"/>
+        <p14:creationId xmlns:p14="http://schemas.microsoft.com/office/powerpoint/2010/main" val="1299892291"/>
       </p:ext>
     </p:extLst>
   </p:cSld>
@@ -5479,7 +5046,7 @@
           <p:cNvPr id="2" name="Título 1">
             <a:extLst>
               <a:ext uri="{FF2B5EF4-FFF2-40B4-BE49-F238E27FC236}">
-                <a16:creationId xmlns:a16="http://schemas.microsoft.com/office/drawing/2014/main" id="{100FF2B4-CB83-0390-1FAE-9D27E3CF6368}"/>
+                <a16:creationId xmlns:a16="http://schemas.microsoft.com/office/drawing/2014/main" id="{CD0BFF2D-F239-DE27-3D81-A027D9E9CE34}"/>
               </a:ext>
             </a:extLst>
           </p:cNvPr>
@@ -5496,25 +5063,18 @@
           <a:lstStyle/>
           <a:p>
             <a:r>
-              <a:rPr lang="pt-PT" b="0" i="0" dirty="0">
-                <a:solidFill>
-                  <a:srgbClr val="1D2125"/>
-                </a:solidFill>
-                <a:effectLst/>
-                <a:latin typeface="-apple-system"/>
-              </a:rPr>
-              <a:t>Histórias de utilização</a:t>
-            </a:r>
-            <a:endParaRPr lang="en-GB" dirty="0"/>
+              <a:rPr lang="en-GB" dirty="0"/>
+              <a:t>Data Model</a:t>
+            </a:r>
           </a:p>
         </p:txBody>
       </p:sp>
       <p:pic>
         <p:nvPicPr>
-          <p:cNvPr id="5" name="Marcador de Posição de Conteúdo 4" descr="Uma imagem com diagrama, Esquema, Desenho técnico, file&#10;&#10;Descrição gerada automaticamente">
-            <a:extLst>
-              <a:ext uri="{FF2B5EF4-FFF2-40B4-BE49-F238E27FC236}">
-                <a16:creationId xmlns:a16="http://schemas.microsoft.com/office/drawing/2014/main" id="{081F4255-4308-F471-66A3-A9629132F372}"/>
+          <p:cNvPr id="5" name="Marcador de Posição de Conteúdo 4" descr="Uma imagem com texto, captura de ecrã, círculo, design&#10;&#10;Descrição gerada automaticamente">
+            <a:extLst>
+              <a:ext uri="{FF2B5EF4-FFF2-40B4-BE49-F238E27FC236}">
+                <a16:creationId xmlns:a16="http://schemas.microsoft.com/office/drawing/2014/main" id="{B984FBD5-3B28-ED49-9E3B-D2942D236E60}"/>
               </a:ext>
             </a:extLst>
           </p:cNvPr>
@@ -5539,15 +5099,51 @@
         </p:blipFill>
         <p:spPr>
           <a:xfrm>
-            <a:off x="838200" y="1928192"/>
-            <a:ext cx="10515600" cy="4146204"/>
+            <a:off x="1489202" y="1690688"/>
+            <a:ext cx="4606798" cy="4351338"/>
           </a:xfrm>
+        </p:spPr>
+      </p:pic>
+      <p:pic>
+        <p:nvPicPr>
+          <p:cNvPr id="7" name="Imagem 6" descr="Uma imagem com texto, captura de ecrã, Tipo de letra, círculo&#10;&#10;Descrição gerada automaticamente">
+            <a:extLst>
+              <a:ext uri="{FF2B5EF4-FFF2-40B4-BE49-F238E27FC236}">
+                <a16:creationId xmlns:a16="http://schemas.microsoft.com/office/drawing/2014/main" id="{6A4CE103-A00F-2735-F6E0-813651C13E9D}"/>
+              </a:ext>
+            </a:extLst>
+          </p:cNvPr>
+          <p:cNvPicPr>
+            <a:picLocks noChangeAspect="1"/>
+          </p:cNvPicPr>
+          <p:nvPr/>
+        </p:nvPicPr>
+        <p:blipFill>
+          <a:blip r:embed="rId3">
+            <a:extLst>
+              <a:ext uri="{28A0092B-C50C-407E-A947-70E740481C1C}">
+                <a14:useLocalDpi xmlns:a14="http://schemas.microsoft.com/office/drawing/2010/main" val="0"/>
+              </a:ext>
+            </a:extLst>
+          </a:blip>
+          <a:stretch>
+            <a:fillRect/>
+          </a:stretch>
+        </p:blipFill>
+        <p:spPr>
+          <a:xfrm>
+            <a:off x="6747002" y="1365251"/>
+            <a:ext cx="3771900" cy="4676775"/>
+          </a:xfrm>
+          <a:prstGeom prst="rect">
+            <a:avLst/>
+          </a:prstGeom>
         </p:spPr>
       </p:pic>
     </p:spTree>
     <p:extLst>
       <p:ext uri="{BB962C8B-B14F-4D97-AF65-F5344CB8AC3E}">
-        <p14:creationId xmlns:p14="http://schemas.microsoft.com/office/powerpoint/2010/main" val="1299892291"/>
+        <p14:creationId xmlns:p14="http://schemas.microsoft.com/office/powerpoint/2010/main" val="2273444681"/>
       </p:ext>
     </p:extLst>
   </p:cSld>

</xml_diff>